<commit_message>
adjusted some presentation points
</commit_message>
<xml_diff>
--- a/My_presentation_chess.pptx
+++ b/My_presentation_chess.pptx
@@ -14373,7 +14373,7 @@
         </p:nvSpPr>
         <p:spPr>
           <a:xfrm>
-            <a:off x="982133" y="1420868"/>
+            <a:off x="982133" y="1182231"/>
             <a:ext cx="10227733" cy="2246769"/>
           </a:xfrm>
           <a:prstGeom prst="rect">
@@ -14457,6 +14457,561 @@
           </a:p>
         </p:txBody>
       </p:sp>
+      <p:sp>
+        <p:nvSpPr>
+          <p:cNvPr id="4" name="Rectangle: Rounded Corners 3">
+            <a:extLst>
+              <a:ext uri="{FF2B5EF4-FFF2-40B4-BE49-F238E27FC236}">
+                <a16:creationId xmlns:a16="http://schemas.microsoft.com/office/drawing/2014/main" id="{39A5987B-7280-4282-AAFB-788D9319F5D9}"/>
+              </a:ext>
+            </a:extLst>
+          </p:cNvPr>
+          <p:cNvSpPr/>
+          <p:nvPr/>
+        </p:nvSpPr>
+        <p:spPr>
+          <a:xfrm>
+            <a:off x="2023536" y="3316941"/>
+            <a:ext cx="1750606" cy="537882"/>
+          </a:xfrm>
+          <a:prstGeom prst="roundRect">
+            <a:avLst/>
+          </a:prstGeom>
+          <a:solidFill>
+            <a:srgbClr val="6D7CAF"/>
+          </a:solidFill>
+          <a:ln>
+            <a:noFill/>
+          </a:ln>
+        </p:spPr>
+        <p:style>
+          <a:lnRef idx="2">
+            <a:schemeClr val="accent1">
+              <a:shade val="50000"/>
+            </a:schemeClr>
+          </a:lnRef>
+          <a:fillRef idx="1">
+            <a:schemeClr val="accent1"/>
+          </a:fillRef>
+          <a:effectRef idx="0">
+            <a:schemeClr val="accent1"/>
+          </a:effectRef>
+          <a:fontRef idx="minor">
+            <a:schemeClr val="lt1"/>
+          </a:fontRef>
+        </p:style>
+        <p:txBody>
+          <a:bodyPr rtlCol="0" anchor="ctr"/>
+          <a:lstStyle/>
+          <a:p>
+            <a:pPr algn="ctr"/>
+            <a:r>
+              <a:rPr lang="en-US" sz="1400" dirty="0">
+                <a:latin typeface="Century Gothic" panose="020B0502020202020204" pitchFamily="34" charset="0"/>
+              </a:rPr>
+              <a:t>Players Ratings</a:t>
+            </a:r>
+          </a:p>
+        </p:txBody>
+      </p:sp>
+      <p:sp>
+        <p:nvSpPr>
+          <p:cNvPr id="6" name="Rectangle: Rounded Corners 5">
+            <a:extLst>
+              <a:ext uri="{FF2B5EF4-FFF2-40B4-BE49-F238E27FC236}">
+                <a16:creationId xmlns:a16="http://schemas.microsoft.com/office/drawing/2014/main" id="{28068267-66B9-443E-8480-1668F427A0F1}"/>
+              </a:ext>
+            </a:extLst>
+          </p:cNvPr>
+          <p:cNvSpPr/>
+          <p:nvPr/>
+        </p:nvSpPr>
+        <p:spPr>
+          <a:xfrm>
+            <a:off x="2023534" y="4081183"/>
+            <a:ext cx="1750606" cy="537882"/>
+          </a:xfrm>
+          <a:prstGeom prst="roundRect">
+            <a:avLst/>
+          </a:prstGeom>
+          <a:solidFill>
+            <a:srgbClr val="6D7CAF"/>
+          </a:solidFill>
+          <a:ln>
+            <a:noFill/>
+          </a:ln>
+        </p:spPr>
+        <p:style>
+          <a:lnRef idx="2">
+            <a:schemeClr val="accent1">
+              <a:shade val="50000"/>
+            </a:schemeClr>
+          </a:lnRef>
+          <a:fillRef idx="1">
+            <a:schemeClr val="accent1"/>
+          </a:fillRef>
+          <a:effectRef idx="0">
+            <a:schemeClr val="accent1"/>
+          </a:effectRef>
+          <a:fontRef idx="minor">
+            <a:schemeClr val="lt1"/>
+          </a:fontRef>
+        </p:style>
+        <p:txBody>
+          <a:bodyPr rtlCol="0" anchor="ctr"/>
+          <a:lstStyle/>
+          <a:p>
+            <a:pPr algn="ctr"/>
+            <a:r>
+              <a:rPr lang="en-US" sz="1400" dirty="0">
+                <a:latin typeface="Century Gothic" panose="020B0502020202020204" pitchFamily="34" charset="0"/>
+              </a:rPr>
+              <a:t>Opening Move</a:t>
+            </a:r>
+          </a:p>
+        </p:txBody>
+      </p:sp>
+      <p:sp>
+        <p:nvSpPr>
+          <p:cNvPr id="7" name="Rectangle: Rounded Corners 6">
+            <a:extLst>
+              <a:ext uri="{FF2B5EF4-FFF2-40B4-BE49-F238E27FC236}">
+                <a16:creationId xmlns:a16="http://schemas.microsoft.com/office/drawing/2014/main" id="{ADE09AC3-7239-4EF3-81C2-A7F1CB175F6E}"/>
+              </a:ext>
+            </a:extLst>
+          </p:cNvPr>
+          <p:cNvSpPr/>
+          <p:nvPr/>
+        </p:nvSpPr>
+        <p:spPr>
+          <a:xfrm>
+            <a:off x="2023534" y="4787156"/>
+            <a:ext cx="1750606" cy="537882"/>
+          </a:xfrm>
+          <a:prstGeom prst="roundRect">
+            <a:avLst/>
+          </a:prstGeom>
+          <a:solidFill>
+            <a:srgbClr val="6D7CAF"/>
+          </a:solidFill>
+          <a:ln>
+            <a:noFill/>
+          </a:ln>
+        </p:spPr>
+        <p:style>
+          <a:lnRef idx="2">
+            <a:schemeClr val="accent1">
+              <a:shade val="50000"/>
+            </a:schemeClr>
+          </a:lnRef>
+          <a:fillRef idx="1">
+            <a:schemeClr val="accent1"/>
+          </a:fillRef>
+          <a:effectRef idx="0">
+            <a:schemeClr val="accent1"/>
+          </a:effectRef>
+          <a:fontRef idx="minor">
+            <a:schemeClr val="lt1"/>
+          </a:fontRef>
+        </p:style>
+        <p:txBody>
+          <a:bodyPr rtlCol="0" anchor="ctr"/>
+          <a:lstStyle/>
+          <a:p>
+            <a:pPr algn="ctr"/>
+            <a:r>
+              <a:rPr lang="en-US" sz="1400" dirty="0">
+                <a:latin typeface="Century Gothic" panose="020B0502020202020204" pitchFamily="34" charset="0"/>
+              </a:rPr>
+              <a:t>Time Rules</a:t>
+            </a:r>
+          </a:p>
+        </p:txBody>
+      </p:sp>
+      <p:sp>
+        <p:nvSpPr>
+          <p:cNvPr id="8" name="Rectangle: Rounded Corners 7">
+            <a:extLst>
+              <a:ext uri="{FF2B5EF4-FFF2-40B4-BE49-F238E27FC236}">
+                <a16:creationId xmlns:a16="http://schemas.microsoft.com/office/drawing/2014/main" id="{F9E159D1-AEF0-4FC1-8D75-648C448D836A}"/>
+              </a:ext>
+            </a:extLst>
+          </p:cNvPr>
+          <p:cNvSpPr/>
+          <p:nvPr/>
+        </p:nvSpPr>
+        <p:spPr>
+          <a:xfrm>
+            <a:off x="2023534" y="5551398"/>
+            <a:ext cx="1750606" cy="537882"/>
+          </a:xfrm>
+          <a:prstGeom prst="roundRect">
+            <a:avLst/>
+          </a:prstGeom>
+          <a:solidFill>
+            <a:srgbClr val="6D7CAF"/>
+          </a:solidFill>
+          <a:ln>
+            <a:noFill/>
+          </a:ln>
+        </p:spPr>
+        <p:style>
+          <a:lnRef idx="2">
+            <a:schemeClr val="accent1">
+              <a:shade val="50000"/>
+            </a:schemeClr>
+          </a:lnRef>
+          <a:fillRef idx="1">
+            <a:schemeClr val="accent1"/>
+          </a:fillRef>
+          <a:effectRef idx="0">
+            <a:schemeClr val="accent1"/>
+          </a:effectRef>
+          <a:fontRef idx="minor">
+            <a:schemeClr val="lt1"/>
+          </a:fontRef>
+        </p:style>
+        <p:txBody>
+          <a:bodyPr rtlCol="0" anchor="ctr"/>
+          <a:lstStyle/>
+          <a:p>
+            <a:pPr algn="ctr"/>
+            <a:r>
+              <a:rPr lang="en-US" sz="1400" dirty="0">
+                <a:latin typeface="Century Gothic" panose="020B0502020202020204" pitchFamily="34" charset="0"/>
+              </a:rPr>
+              <a:t>Number of moves</a:t>
+            </a:r>
+          </a:p>
+        </p:txBody>
+      </p:sp>
+      <p:sp>
+        <p:nvSpPr>
+          <p:cNvPr id="9" name="Rectangle: Rounded Corners 8">
+            <a:extLst>
+              <a:ext uri="{FF2B5EF4-FFF2-40B4-BE49-F238E27FC236}">
+                <a16:creationId xmlns:a16="http://schemas.microsoft.com/office/drawing/2014/main" id="{FFDAB881-34A1-4844-94FA-973157F027AD}"/>
+              </a:ext>
+            </a:extLst>
+          </p:cNvPr>
+          <p:cNvSpPr/>
+          <p:nvPr/>
+        </p:nvSpPr>
+        <p:spPr>
+          <a:xfrm>
+            <a:off x="5165164" y="3951769"/>
+            <a:ext cx="1317811" cy="1466898"/>
+          </a:xfrm>
+          <a:prstGeom prst="roundRect">
+            <a:avLst/>
+          </a:prstGeom>
+          <a:solidFill>
+            <a:srgbClr val="9E3B50"/>
+          </a:solidFill>
+          <a:ln>
+            <a:noFill/>
+          </a:ln>
+        </p:spPr>
+        <p:style>
+          <a:lnRef idx="2">
+            <a:schemeClr val="accent1">
+              <a:shade val="50000"/>
+            </a:schemeClr>
+          </a:lnRef>
+          <a:fillRef idx="1">
+            <a:schemeClr val="accent1"/>
+          </a:fillRef>
+          <a:effectRef idx="0">
+            <a:schemeClr val="accent1"/>
+          </a:effectRef>
+          <a:fontRef idx="minor">
+            <a:schemeClr val="lt1"/>
+          </a:fontRef>
+        </p:style>
+        <p:txBody>
+          <a:bodyPr rtlCol="0" anchor="ctr"/>
+          <a:lstStyle/>
+          <a:p>
+            <a:pPr algn="ctr"/>
+            <a:r>
+              <a:rPr lang="en-US" sz="1400" dirty="0">
+                <a:latin typeface="Century Gothic" panose="020B0502020202020204" pitchFamily="34" charset="0"/>
+              </a:rPr>
+              <a:t>Model</a:t>
+            </a:r>
+          </a:p>
+        </p:txBody>
+      </p:sp>
+      <p:sp>
+        <p:nvSpPr>
+          <p:cNvPr id="10" name="Rectangle: Rounded Corners 9">
+            <a:extLst>
+              <a:ext uri="{FF2B5EF4-FFF2-40B4-BE49-F238E27FC236}">
+                <a16:creationId xmlns:a16="http://schemas.microsoft.com/office/drawing/2014/main" id="{EE66B84D-9C01-421B-86FD-EDFFEED284FA}"/>
+              </a:ext>
+            </a:extLst>
+          </p:cNvPr>
+          <p:cNvSpPr/>
+          <p:nvPr/>
+        </p:nvSpPr>
+        <p:spPr>
+          <a:xfrm>
+            <a:off x="7649383" y="4416277"/>
+            <a:ext cx="1317811" cy="537882"/>
+          </a:xfrm>
+          <a:prstGeom prst="roundRect">
+            <a:avLst/>
+          </a:prstGeom>
+          <a:solidFill>
+            <a:srgbClr val="511A75"/>
+          </a:solidFill>
+          <a:ln>
+            <a:noFill/>
+          </a:ln>
+        </p:spPr>
+        <p:style>
+          <a:lnRef idx="2">
+            <a:schemeClr val="accent1">
+              <a:shade val="50000"/>
+            </a:schemeClr>
+          </a:lnRef>
+          <a:fillRef idx="1">
+            <a:schemeClr val="accent1"/>
+          </a:fillRef>
+          <a:effectRef idx="0">
+            <a:schemeClr val="accent1"/>
+          </a:effectRef>
+          <a:fontRef idx="minor">
+            <a:schemeClr val="lt1"/>
+          </a:fontRef>
+        </p:style>
+        <p:txBody>
+          <a:bodyPr rtlCol="0" anchor="ctr"/>
+          <a:lstStyle/>
+          <a:p>
+            <a:pPr algn="ctr"/>
+            <a:r>
+              <a:rPr lang="en-US" sz="1400" dirty="0">
+                <a:latin typeface="Century Gothic" panose="020B0502020202020204" pitchFamily="34" charset="0"/>
+              </a:rPr>
+              <a:t>Winner</a:t>
+            </a:r>
+          </a:p>
+        </p:txBody>
+      </p:sp>
+      <p:cxnSp>
+        <p:nvCxnSpPr>
+          <p:cNvPr id="12" name="Straight Arrow Connector 11">
+            <a:extLst>
+              <a:ext uri="{FF2B5EF4-FFF2-40B4-BE49-F238E27FC236}">
+                <a16:creationId xmlns:a16="http://schemas.microsoft.com/office/drawing/2014/main" id="{AD400D6B-1C36-4A63-AD32-A7CD3A3C1B27}"/>
+              </a:ext>
+            </a:extLst>
+          </p:cNvPr>
+          <p:cNvCxnSpPr>
+            <a:stCxn id="4" idx="3"/>
+            <a:endCxn id="9" idx="1"/>
+          </p:cNvCxnSpPr>
+          <p:nvPr/>
+        </p:nvCxnSpPr>
+        <p:spPr>
+          <a:xfrm>
+            <a:off x="3774142" y="3585882"/>
+            <a:ext cx="1391022" cy="1099336"/>
+          </a:xfrm>
+          <a:prstGeom prst="straightConnector1">
+            <a:avLst/>
+          </a:prstGeom>
+          <a:ln>
+            <a:tailEnd type="triangle"/>
+          </a:ln>
+        </p:spPr>
+        <p:style>
+          <a:lnRef idx="3">
+            <a:schemeClr val="dk1"/>
+          </a:lnRef>
+          <a:fillRef idx="0">
+            <a:schemeClr val="dk1"/>
+          </a:fillRef>
+          <a:effectRef idx="2">
+            <a:schemeClr val="dk1"/>
+          </a:effectRef>
+          <a:fontRef idx="minor">
+            <a:schemeClr val="tx1"/>
+          </a:fontRef>
+        </p:style>
+      </p:cxnSp>
+      <p:cxnSp>
+        <p:nvCxnSpPr>
+          <p:cNvPr id="13" name="Straight Arrow Connector 12">
+            <a:extLst>
+              <a:ext uri="{FF2B5EF4-FFF2-40B4-BE49-F238E27FC236}">
+                <a16:creationId xmlns:a16="http://schemas.microsoft.com/office/drawing/2014/main" id="{57EA141B-C12C-4155-B7C9-A437A6CBEE02}"/>
+              </a:ext>
+            </a:extLst>
+          </p:cNvPr>
+          <p:cNvCxnSpPr>
+            <a:cxnSpLocks/>
+            <a:endCxn id="9" idx="1"/>
+          </p:cNvCxnSpPr>
+          <p:nvPr/>
+        </p:nvCxnSpPr>
+        <p:spPr>
+          <a:xfrm>
+            <a:off x="3774140" y="4332195"/>
+            <a:ext cx="1391024" cy="353023"/>
+          </a:xfrm>
+          <a:prstGeom prst="straightConnector1">
+            <a:avLst/>
+          </a:prstGeom>
+          <a:ln>
+            <a:tailEnd type="triangle"/>
+          </a:ln>
+        </p:spPr>
+        <p:style>
+          <a:lnRef idx="3">
+            <a:schemeClr val="dk1"/>
+          </a:lnRef>
+          <a:fillRef idx="0">
+            <a:schemeClr val="dk1"/>
+          </a:fillRef>
+          <a:effectRef idx="2">
+            <a:schemeClr val="dk1"/>
+          </a:effectRef>
+          <a:fontRef idx="minor">
+            <a:schemeClr val="tx1"/>
+          </a:fontRef>
+        </p:style>
+      </p:cxnSp>
+      <p:cxnSp>
+        <p:nvCxnSpPr>
+          <p:cNvPr id="15" name="Straight Arrow Connector 14">
+            <a:extLst>
+              <a:ext uri="{FF2B5EF4-FFF2-40B4-BE49-F238E27FC236}">
+                <a16:creationId xmlns:a16="http://schemas.microsoft.com/office/drawing/2014/main" id="{9106317F-36BC-4D1C-978B-0550111CC1D5}"/>
+              </a:ext>
+            </a:extLst>
+          </p:cNvPr>
+          <p:cNvCxnSpPr>
+            <a:cxnSpLocks/>
+            <a:stCxn id="7" idx="3"/>
+            <a:endCxn id="9" idx="1"/>
+          </p:cNvCxnSpPr>
+          <p:nvPr/>
+        </p:nvCxnSpPr>
+        <p:spPr>
+          <a:xfrm flipV="1">
+            <a:off x="3774140" y="4685218"/>
+            <a:ext cx="1391024" cy="370879"/>
+          </a:xfrm>
+          <a:prstGeom prst="straightConnector1">
+            <a:avLst/>
+          </a:prstGeom>
+          <a:ln>
+            <a:tailEnd type="triangle"/>
+          </a:ln>
+        </p:spPr>
+        <p:style>
+          <a:lnRef idx="3">
+            <a:schemeClr val="dk1"/>
+          </a:lnRef>
+          <a:fillRef idx="0">
+            <a:schemeClr val="dk1"/>
+          </a:fillRef>
+          <a:effectRef idx="2">
+            <a:schemeClr val="dk1"/>
+          </a:effectRef>
+          <a:fontRef idx="minor">
+            <a:schemeClr val="tx1"/>
+          </a:fontRef>
+        </p:style>
+      </p:cxnSp>
+      <p:cxnSp>
+        <p:nvCxnSpPr>
+          <p:cNvPr id="17" name="Straight Arrow Connector 16">
+            <a:extLst>
+              <a:ext uri="{FF2B5EF4-FFF2-40B4-BE49-F238E27FC236}">
+                <a16:creationId xmlns:a16="http://schemas.microsoft.com/office/drawing/2014/main" id="{10D1FB5F-44F7-4F06-AB7E-7B282534B9FE}"/>
+              </a:ext>
+            </a:extLst>
+          </p:cNvPr>
+          <p:cNvCxnSpPr>
+            <a:cxnSpLocks/>
+            <a:stCxn id="8" idx="3"/>
+            <a:endCxn id="9" idx="1"/>
+          </p:cNvCxnSpPr>
+          <p:nvPr/>
+        </p:nvCxnSpPr>
+        <p:spPr>
+          <a:xfrm flipV="1">
+            <a:off x="3774140" y="4685218"/>
+            <a:ext cx="1391024" cy="1135121"/>
+          </a:xfrm>
+          <a:prstGeom prst="straightConnector1">
+            <a:avLst/>
+          </a:prstGeom>
+          <a:ln>
+            <a:tailEnd type="triangle"/>
+          </a:ln>
+        </p:spPr>
+        <p:style>
+          <a:lnRef idx="3">
+            <a:schemeClr val="dk1"/>
+          </a:lnRef>
+          <a:fillRef idx="0">
+            <a:schemeClr val="dk1"/>
+          </a:fillRef>
+          <a:effectRef idx="2">
+            <a:schemeClr val="dk1"/>
+          </a:effectRef>
+          <a:fontRef idx="minor">
+            <a:schemeClr val="tx1"/>
+          </a:fontRef>
+        </p:style>
+      </p:cxnSp>
+      <p:cxnSp>
+        <p:nvCxnSpPr>
+          <p:cNvPr id="22" name="Straight Arrow Connector 21">
+            <a:extLst>
+              <a:ext uri="{FF2B5EF4-FFF2-40B4-BE49-F238E27FC236}">
+                <a16:creationId xmlns:a16="http://schemas.microsoft.com/office/drawing/2014/main" id="{33DFB833-62EB-497C-8D2C-A92BA13A0271}"/>
+              </a:ext>
+            </a:extLst>
+          </p:cNvPr>
+          <p:cNvCxnSpPr>
+            <a:cxnSpLocks/>
+            <a:stCxn id="9" idx="3"/>
+            <a:endCxn id="10" idx="1"/>
+          </p:cNvCxnSpPr>
+          <p:nvPr/>
+        </p:nvCxnSpPr>
+        <p:spPr>
+          <a:xfrm>
+            <a:off x="6482975" y="4685218"/>
+            <a:ext cx="1166408" cy="0"/>
+          </a:xfrm>
+          <a:prstGeom prst="straightConnector1">
+            <a:avLst/>
+          </a:prstGeom>
+          <a:ln>
+            <a:tailEnd type="triangle"/>
+          </a:ln>
+        </p:spPr>
+        <p:style>
+          <a:lnRef idx="3">
+            <a:schemeClr val="dk1"/>
+          </a:lnRef>
+          <a:fillRef idx="0">
+            <a:schemeClr val="dk1"/>
+          </a:fillRef>
+          <a:effectRef idx="2">
+            <a:schemeClr val="dk1"/>
+          </a:effectRef>
+          <a:fontRef idx="minor">
+            <a:schemeClr val="tx1"/>
+          </a:fontRef>
+        </p:style>
+      </p:cxnSp>
     </p:spTree>
     <p:extLst>
       <p:ext uri="{BB962C8B-B14F-4D97-AF65-F5344CB8AC3E}">
@@ -16917,7 +17472,7 @@
         <p:spPr>
           <a:xfrm>
             <a:off x="563880" y="1010186"/>
-            <a:ext cx="8686800" cy="707886"/>
+            <a:ext cx="10759440" cy="646331"/>
           </a:xfrm>
           <a:prstGeom prst="rect">
             <a:avLst/>
@@ -16931,13 +17486,49 @@
           <a:lstStyle/>
           <a:p>
             <a:r>
-              <a:rPr lang="en-US" sz="2000" dirty="0">
+              <a:rPr lang="en-US" dirty="0">
                 <a:solidFill>
                   <a:srgbClr val="30383B"/>
                 </a:solidFill>
                 <a:latin typeface="Century Gothic" panose="020B0502020202020204" pitchFamily="34" charset="0"/>
               </a:rPr>
-              <a:t>The dataset was obtained from Kaggle, it’s rich in information which needs to be handled with first before performing nay modellings</a:t>
+              <a:t>The dataset was obtained from Kaggle, it’s rich in information which needs to be handled with first before performing nay modellings it contains </a:t>
+            </a:r>
+            <a:r>
+              <a:rPr lang="en-US" u="sng" dirty="0">
+                <a:solidFill>
+                  <a:srgbClr val="30383B"/>
+                </a:solidFill>
+                <a:latin typeface="Century Gothic" panose="020B0502020202020204" pitchFamily="34" charset="0"/>
+              </a:rPr>
+              <a:t>20,000</a:t>
+            </a:r>
+            <a:r>
+              <a:rPr lang="en-US" dirty="0">
+                <a:solidFill>
+                  <a:srgbClr val="30383B"/>
+                </a:solidFill>
+                <a:latin typeface="Century Gothic" panose="020B0502020202020204" pitchFamily="34" charset="0"/>
+              </a:rPr>
+              <a:t> datapoints and </a:t>
+            </a:r>
+            <a:r>
+              <a:rPr lang="en-US" u="sng" dirty="0">
+                <a:solidFill>
+                  <a:srgbClr val="30383B"/>
+                </a:solidFill>
+                <a:latin typeface="Century Gothic" panose="020B0502020202020204" pitchFamily="34" charset="0"/>
+              </a:rPr>
+              <a:t>16 features</a:t>
+            </a:r>
+            <a:r>
+              <a:rPr lang="en-US" dirty="0">
+                <a:solidFill>
+                  <a:srgbClr val="30383B"/>
+                </a:solidFill>
+                <a:latin typeface="Century Gothic" panose="020B0502020202020204" pitchFamily="34" charset="0"/>
+              </a:rPr>
+              <a:t>.</a:t>
             </a:r>
           </a:p>
         </p:txBody>
@@ -18228,7 +18819,7 @@
         <p:spPr>
           <a:xfrm>
             <a:off x="449062" y="3105834"/>
-            <a:ext cx="3911271" cy="646331"/>
+            <a:ext cx="3911271" cy="1200329"/>
           </a:xfrm>
           <a:prstGeom prst="rect">
             <a:avLst/>
@@ -18243,7 +18834,16 @@
           <a:p>
             <a:r>
               <a:rPr lang="en-US" dirty="0"/>
-              <a:t>The fight between white and black is a close call , white edges a little bit</a:t>
+              <a:t>The fight between white and black is a close call , white edges a little bit.</a:t>
+            </a:r>
+          </a:p>
+          <a:p>
+            <a:endParaRPr lang="en-US" dirty="0"/>
+          </a:p>
+          <a:p>
+            <a:r>
+              <a:rPr lang="en-US" dirty="0"/>
+              <a:t>This a multi-classification problem</a:t>
             </a:r>
           </a:p>
         </p:txBody>
@@ -19022,6 +19622,24 @@
 </file>
 
 <file path=customXml/item1.xml><?xml version="1.0" encoding="utf-8"?>
+<?mso-contentType ?>
+<FormTemplates xmlns="http://schemas.microsoft.com/sharepoint/v3/contenttype/forms">
+  <Display>DocumentLibraryForm</Display>
+  <Edit>DocumentLibraryForm</Edit>
+  <New>DocumentLibraryForm</New>
+</FormTemplates>
+</file>
+
+<file path=customXml/item2.xml><?xml version="1.0" encoding="utf-8"?>
+<p:properties xmlns:p="http://schemas.microsoft.com/office/2006/metadata/properties" xmlns:xsi="http://www.w3.org/2001/XMLSchema-instance" xmlns:pc="http://schemas.microsoft.com/office/infopath/2007/PartnerControls">
+  <documentManagement>
+    <Status xmlns="71af3243-3dd4-4a8d-8c0d-dd76da1f02a5">Not started</Status>
+    <MediaServiceKeyPoints xmlns="71af3243-3dd4-4a8d-8c0d-dd76da1f02a5" xsi:nil="true"/>
+  </documentManagement>
+</p:properties>
+</file>
+
+<file path=customXml/item3.xml><?xml version="1.0" encoding="utf-8"?>
 <ct:contentTypeSchema xmlns:ct="http://schemas.microsoft.com/office/2006/metadata/contentType" xmlns:ma="http://schemas.microsoft.com/office/2006/metadata/properties/metaAttributes" ct:_="" ma:_="" ma:contentTypeName="Document" ma:contentTypeID="0x01010079F111ED35F8CC479449609E8A0923A6" ma:contentTypeVersion="12" ma:contentTypeDescription="Create a new document." ma:contentTypeScope="" ma:versionID="a410dd7f93c95333ffa1b60ed6adedd1">
   <xsd:schema xmlns:xsd="http://www.w3.org/2001/XMLSchema" xmlns:xs="http://www.w3.org/2001/XMLSchema" xmlns:p="http://schemas.microsoft.com/office/2006/metadata/properties" xmlns:ns2="71af3243-3dd4-4a8d-8c0d-dd76da1f02a5" xmlns:ns3="16c05727-aa75-4e4a-9b5f-8a80a1165891" targetNamespace="http://schemas.microsoft.com/office/2006/metadata/properties" ma:root="true" ma:fieldsID="a936d9baba76aa3866493feff160faab" ns2:_="" ns3:_="">
     <xsd:import namespace="71af3243-3dd4-4a8d-8c0d-dd76da1f02a5"/>
@@ -19242,25 +19860,25 @@
 </ct:contentTypeSchema>
 </file>
 
-<file path=customXml/item2.xml><?xml version="1.0" encoding="utf-8"?>
-<p:properties xmlns:p="http://schemas.microsoft.com/office/2006/metadata/properties" xmlns:xsi="http://www.w3.org/2001/XMLSchema-instance" xmlns:pc="http://schemas.microsoft.com/office/infopath/2007/PartnerControls">
-  <documentManagement>
-    <Status xmlns="71af3243-3dd4-4a8d-8c0d-dd76da1f02a5">Not started</Status>
-    <MediaServiceKeyPoints xmlns="71af3243-3dd4-4a8d-8c0d-dd76da1f02a5" xsi:nil="true"/>
-  </documentManagement>
-</p:properties>
+<file path=customXml/itemProps1.xml><?xml version="1.0" encoding="utf-8"?>
+<ds:datastoreItem xmlns:ds="http://schemas.openxmlformats.org/officeDocument/2006/customXml" ds:itemID="{AA3F7EDC-E5B4-4BBC-9D2A-CBE6D46C37AD}">
+  <ds:schemaRefs>
+    <ds:schemaRef ds:uri="http://schemas.microsoft.com/sharepoint/v3/contenttype/forms"/>
+  </ds:schemaRefs>
+</ds:datastoreItem>
 </file>
 
-<file path=customXml/item3.xml><?xml version="1.0" encoding="utf-8"?>
-<?mso-contentType ?>
-<FormTemplates xmlns="http://schemas.microsoft.com/sharepoint/v3/contenttype/forms">
-  <Display>DocumentLibraryForm</Display>
-  <Edit>DocumentLibraryForm</Edit>
-  <New>DocumentLibraryForm</New>
-</FormTemplates>
+<file path=customXml/itemProps2.xml><?xml version="1.0" encoding="utf-8"?>
+<ds:datastoreItem xmlns:ds="http://schemas.openxmlformats.org/officeDocument/2006/customXml" ds:itemID="{A03EEFF0-FB57-4CB4-8BFC-DF397689E2ED}">
+  <ds:schemaRefs>
+    <ds:schemaRef ds:uri="http://schemas.microsoft.com/office/2006/metadata/properties"/>
+    <ds:schemaRef ds:uri="http://schemas.microsoft.com/office/infopath/2007/PartnerControls"/>
+    <ds:schemaRef ds:uri="71af3243-3dd4-4a8d-8c0d-dd76da1f02a5"/>
+  </ds:schemaRefs>
+</ds:datastoreItem>
 </file>
 
-<file path=customXml/itemProps1.xml><?xml version="1.0" encoding="utf-8"?>
+<file path=customXml/itemProps3.xml><?xml version="1.0" encoding="utf-8"?>
 <ds:datastoreItem xmlns:ds="http://schemas.openxmlformats.org/officeDocument/2006/customXml" ds:itemID="{93932EF5-314F-409E-8020-FEE5FA0795B9}">
   <ds:schemaRefs>
     <ds:schemaRef ds:uri="http://schemas.microsoft.com/office/2006/metadata/contentType"/>
@@ -19277,22 +19895,4 @@
     <ds:schemaRef ds:uri="http://schemas.microsoft.com/internal/obd"/>
   </ds:schemaRefs>
 </ds:datastoreItem>
-</file>
-
-<file path=customXml/itemProps2.xml><?xml version="1.0" encoding="utf-8"?>
-<ds:datastoreItem xmlns:ds="http://schemas.openxmlformats.org/officeDocument/2006/customXml" ds:itemID="{A03EEFF0-FB57-4CB4-8BFC-DF397689E2ED}">
-  <ds:schemaRefs>
-    <ds:schemaRef ds:uri="http://schemas.microsoft.com/office/2006/metadata/properties"/>
-    <ds:schemaRef ds:uri="http://schemas.microsoft.com/office/infopath/2007/PartnerControls"/>
-    <ds:schemaRef ds:uri="71af3243-3dd4-4a8d-8c0d-dd76da1f02a5"/>
-  </ds:schemaRefs>
-</ds:datastoreItem>
-</file>
-
-<file path=customXml/itemProps3.xml><?xml version="1.0" encoding="utf-8"?>
-<ds:datastoreItem xmlns:ds="http://schemas.openxmlformats.org/officeDocument/2006/customXml" ds:itemID="{AA3F7EDC-E5B4-4BBC-9D2A-CBE6D46C37AD}">
-  <ds:schemaRefs>
-    <ds:schemaRef ds:uri="http://schemas.microsoft.com/sharepoint/v3/contenttype/forms"/>
-  </ds:schemaRefs>
-</ds:datastoreItem>
 </file>
</xml_diff>

<commit_message>
pushed a minor spelling adjusment in pptx
</commit_message>
<xml_diff>
--- a/My_presentation_chess.pptx
+++ b/My_presentation_chess.pptx
@@ -5,7 +5,7 @@
     <p:sldMasterId id="2147483660" r:id="rId4"/>
   </p:sldMasterIdLst>
   <p:notesMasterIdLst>
-    <p:notesMasterId r:id="rId19"/>
+    <p:notesMasterId r:id="rId20"/>
   </p:notesMasterIdLst>
   <p:sldIdLst>
     <p:sldId id="298" r:id="rId5"/>
@@ -17,11 +17,12 @@
     <p:sldId id="310" r:id="rId11"/>
     <p:sldId id="317" r:id="rId12"/>
     <p:sldId id="304" r:id="rId13"/>
-    <p:sldId id="301" r:id="rId14"/>
-    <p:sldId id="306" r:id="rId15"/>
-    <p:sldId id="314" r:id="rId16"/>
-    <p:sldId id="315" r:id="rId17"/>
-    <p:sldId id="316" r:id="rId18"/>
+    <p:sldId id="318" r:id="rId14"/>
+    <p:sldId id="301" r:id="rId15"/>
+    <p:sldId id="306" r:id="rId16"/>
+    <p:sldId id="314" r:id="rId17"/>
+    <p:sldId id="315" r:id="rId18"/>
+    <p:sldId id="316" r:id="rId19"/>
   </p:sldIdLst>
   <p:sldSz cx="12192000" cy="6858000"/>
   <p:notesSz cx="6858000" cy="9144000"/>
@@ -13167,6 +13168,167 @@
           <a:chExt cx="0" cy="0"/>
         </a:xfrm>
       </p:grpSpPr>
+      <p:sp>
+        <p:nvSpPr>
+          <p:cNvPr id="4" name="TextBox 3">
+            <a:extLst>
+              <a:ext uri="{FF2B5EF4-FFF2-40B4-BE49-F238E27FC236}">
+                <a16:creationId xmlns:a16="http://schemas.microsoft.com/office/drawing/2014/main" id="{1D83BD0D-9646-4ACD-B762-4688F889CCF9}"/>
+              </a:ext>
+            </a:extLst>
+          </p:cNvPr>
+          <p:cNvSpPr txBox="1"/>
+          <p:nvPr/>
+        </p:nvSpPr>
+        <p:spPr>
+          <a:xfrm>
+            <a:off x="0" y="269290"/>
+            <a:ext cx="5388746" cy="523220"/>
+          </a:xfrm>
+          <a:prstGeom prst="rect">
+            <a:avLst/>
+          </a:prstGeom>
+          <a:noFill/>
+        </p:spPr>
+        <p:txBody>
+          <a:bodyPr wrap="square" rtlCol="0">
+            <a:spAutoFit/>
+          </a:bodyPr>
+          <a:lstStyle/>
+          <a:p>
+            <a:r>
+              <a:rPr lang="en-US" sz="2800" dirty="0">
+                <a:latin typeface="Century Gothic" panose="020B0502020202020204" pitchFamily="34" charset="0"/>
+              </a:rPr>
+              <a:t>Top White and Black Players</a:t>
+            </a:r>
+          </a:p>
+        </p:txBody>
+      </p:sp>
+      <p:pic>
+        <p:nvPicPr>
+          <p:cNvPr id="1026" name="Picture 2">
+            <a:extLst>
+              <a:ext uri="{FF2B5EF4-FFF2-40B4-BE49-F238E27FC236}">
+                <a16:creationId xmlns:a16="http://schemas.microsoft.com/office/drawing/2014/main" id="{25B6F725-E188-4364-896A-ACD7196EBD36}"/>
+              </a:ext>
+            </a:extLst>
+          </p:cNvPr>
+          <p:cNvPicPr>
+            <a:picLocks noChangeAspect="1" noChangeArrowheads="1"/>
+          </p:cNvPicPr>
+          <p:nvPr/>
+        </p:nvPicPr>
+        <p:blipFill>
+          <a:blip r:embed="rId2">
+            <a:extLst>
+              <a:ext uri="{28A0092B-C50C-407E-A947-70E740481C1C}">
+                <a14:useLocalDpi xmlns:a14="http://schemas.microsoft.com/office/drawing/2010/main" val="0"/>
+              </a:ext>
+            </a:extLst>
+          </a:blip>
+          <a:srcRect/>
+          <a:stretch>
+            <a:fillRect/>
+          </a:stretch>
+        </p:blipFill>
+        <p:spPr bwMode="auto">
+          <a:xfrm>
+            <a:off x="6355301" y="1868284"/>
+            <a:ext cx="4799768" cy="2897354"/>
+          </a:xfrm>
+          <a:prstGeom prst="rect">
+            <a:avLst/>
+          </a:prstGeom>
+          <a:noFill/>
+          <a:extLst>
+            <a:ext uri="{909E8E84-426E-40DD-AFC4-6F175D3DCCD1}">
+              <a14:hiddenFill xmlns:a14="http://schemas.microsoft.com/office/drawing/2010/main">
+                <a:solidFill>
+                  <a:srgbClr val="FFFFFF"/>
+                </a:solidFill>
+              </a14:hiddenFill>
+            </a:ext>
+          </a:extLst>
+        </p:spPr>
+      </p:pic>
+      <p:pic>
+        <p:nvPicPr>
+          <p:cNvPr id="1028" name="Picture 4">
+            <a:extLst>
+              <a:ext uri="{FF2B5EF4-FFF2-40B4-BE49-F238E27FC236}">
+                <a16:creationId xmlns:a16="http://schemas.microsoft.com/office/drawing/2014/main" id="{B7291301-AEB2-477B-9153-F2E08F3F22CD}"/>
+              </a:ext>
+            </a:extLst>
+          </p:cNvPr>
+          <p:cNvPicPr>
+            <a:picLocks noChangeAspect="1" noChangeArrowheads="1"/>
+          </p:cNvPicPr>
+          <p:nvPr/>
+        </p:nvPicPr>
+        <p:blipFill>
+          <a:blip r:embed="rId3">
+            <a:extLst>
+              <a:ext uri="{28A0092B-C50C-407E-A947-70E740481C1C}">
+                <a14:useLocalDpi xmlns:a14="http://schemas.microsoft.com/office/drawing/2010/main" val="0"/>
+              </a:ext>
+            </a:extLst>
+          </a:blip>
+          <a:srcRect/>
+          <a:stretch>
+            <a:fillRect/>
+          </a:stretch>
+        </p:blipFill>
+        <p:spPr bwMode="auto">
+          <a:xfrm>
+            <a:off x="468711" y="1868285"/>
+            <a:ext cx="4920035" cy="2897354"/>
+          </a:xfrm>
+          <a:prstGeom prst="rect">
+            <a:avLst/>
+          </a:prstGeom>
+          <a:noFill/>
+          <a:extLst>
+            <a:ext uri="{909E8E84-426E-40DD-AFC4-6F175D3DCCD1}">
+              <a14:hiddenFill xmlns:a14="http://schemas.microsoft.com/office/drawing/2010/main">
+                <a:solidFill>
+                  <a:srgbClr val="FFFFFF"/>
+                </a:solidFill>
+              </a14:hiddenFill>
+            </a:ext>
+          </a:extLst>
+        </p:spPr>
+      </p:pic>
+    </p:spTree>
+    <p:extLst>
+      <p:ext uri="{BB962C8B-B14F-4D97-AF65-F5344CB8AC3E}">
+        <p14:creationId xmlns:p14="http://schemas.microsoft.com/office/powerpoint/2010/main" val="1434850474"/>
+      </p:ext>
+    </p:extLst>
+  </p:cSld>
+  <p:clrMapOvr>
+    <a:masterClrMapping/>
+  </p:clrMapOvr>
+</p:sld>
+</file>
+
+<file path=ppt/slides/slide11.xml><?xml version="1.0" encoding="utf-8"?>
+<p:sld xmlns:a="http://schemas.openxmlformats.org/drawingml/2006/main" xmlns:r="http://schemas.openxmlformats.org/officeDocument/2006/relationships" xmlns:p="http://schemas.openxmlformats.org/presentationml/2006/main">
+  <p:cSld>
+    <p:spTree>
+      <p:nvGrpSpPr>
+        <p:cNvPr id="1" name=""/>
+        <p:cNvGrpSpPr/>
+        <p:nvPr/>
+      </p:nvGrpSpPr>
+      <p:grpSpPr>
+        <a:xfrm>
+          <a:off x="0" y="0"/>
+          <a:ext cx="0" cy="0"/>
+          <a:chOff x="0" y="0"/>
+          <a:chExt cx="0" cy="0"/>
+        </a:xfrm>
+      </p:grpSpPr>
       <p:pic>
         <p:nvPicPr>
           <p:cNvPr id="16" name="Picture 15" descr="Graphical user interface, application, Teams&#10;&#10;Description automatically generated">
@@ -13253,7 +13415,7 @@
 </p:sld>
 </file>
 
-<file path=ppt/slides/slide11.xml><?xml version="1.0" encoding="utf-8"?>
+<file path=ppt/slides/slide12.xml><?xml version="1.0" encoding="utf-8"?>
 <p:sld xmlns:a="http://schemas.openxmlformats.org/drawingml/2006/main" xmlns:r="http://schemas.openxmlformats.org/officeDocument/2006/relationships" xmlns:p="http://schemas.openxmlformats.org/presentationml/2006/main">
   <p:cSld>
     <p:spTree>
@@ -14052,7 +14214,7 @@
 </p:sld>
 </file>
 
-<file path=ppt/slides/slide12.xml><?xml version="1.0" encoding="utf-8"?>
+<file path=ppt/slides/slide13.xml><?xml version="1.0" encoding="utf-8"?>
 <p:sld xmlns:a="http://schemas.openxmlformats.org/drawingml/2006/main" xmlns:r="http://schemas.openxmlformats.org/officeDocument/2006/relationships" xmlns:p="http://schemas.openxmlformats.org/presentationml/2006/main">
   <p:cSld>
     <p:spTree>
@@ -14302,7 +14464,7 @@
 </p:sld>
 </file>
 
-<file path=ppt/slides/slide13.xml><?xml version="1.0" encoding="utf-8"?>
+<file path=ppt/slides/slide14.xml><?xml version="1.0" encoding="utf-8"?>
 <p:sld xmlns:a="http://schemas.openxmlformats.org/drawingml/2006/main" xmlns:r="http://schemas.openxmlformats.org/officeDocument/2006/relationships" xmlns:p="http://schemas.openxmlformats.org/presentationml/2006/main">
   <p:cSld>
     <p:spTree>
@@ -15025,7 +15187,7 @@
 </p:sld>
 </file>
 
-<file path=ppt/slides/slide14.xml><?xml version="1.0" encoding="utf-8"?>
+<file path=ppt/slides/slide15.xml><?xml version="1.0" encoding="utf-8"?>
 <p:sld xmlns:a="http://schemas.openxmlformats.org/drawingml/2006/main" xmlns:r="http://schemas.openxmlformats.org/officeDocument/2006/relationships" xmlns:p="http://schemas.openxmlformats.org/presentationml/2006/main">
   <p:cSld>
     <p:spTree>
@@ -18906,7 +19068,7 @@
         </p:blipFill>
         <p:spPr>
           <a:xfrm>
-            <a:off x="-5533" y="1576639"/>
+            <a:off x="0" y="792510"/>
             <a:ext cx="5979614" cy="3350961"/>
           </a:xfrm>
           <a:prstGeom prst="rect">
@@ -18983,6 +19145,73 @@
                 <a:latin typeface="Century Gothic" panose="020B0502020202020204" pitchFamily="34" charset="0"/>
               </a:rPr>
               <a:t>Opening moves data</a:t>
+            </a:r>
+          </a:p>
+        </p:txBody>
+      </p:sp>
+      <p:pic>
+        <p:nvPicPr>
+          <p:cNvPr id="3" name="Picture 2">
+            <a:extLst>
+              <a:ext uri="{FF2B5EF4-FFF2-40B4-BE49-F238E27FC236}">
+                <a16:creationId xmlns:a16="http://schemas.microsoft.com/office/drawing/2014/main" id="{1F69FAA5-39FC-4576-9E1A-F6F739A4A9BE}"/>
+              </a:ext>
+            </a:extLst>
+          </p:cNvPr>
+          <p:cNvPicPr>
+            <a:picLocks noChangeAspect="1"/>
+          </p:cNvPicPr>
+          <p:nvPr/>
+        </p:nvPicPr>
+        <p:blipFill>
+          <a:blip r:embed="rId4"/>
+          <a:stretch>
+            <a:fillRect/>
+          </a:stretch>
+        </p:blipFill>
+        <p:spPr>
+          <a:xfrm>
+            <a:off x="3368532" y="4343525"/>
+            <a:ext cx="1900839" cy="1922019"/>
+          </a:xfrm>
+          <a:prstGeom prst="rect">
+            <a:avLst/>
+          </a:prstGeom>
+        </p:spPr>
+      </p:pic>
+      <p:sp>
+        <p:nvSpPr>
+          <p:cNvPr id="7" name="TextBox 6">
+            <a:extLst>
+              <a:ext uri="{FF2B5EF4-FFF2-40B4-BE49-F238E27FC236}">
+                <a16:creationId xmlns:a16="http://schemas.microsoft.com/office/drawing/2014/main" id="{B180EDAF-5B4A-4FDE-92EA-13D464038D0D}"/>
+              </a:ext>
+            </a:extLst>
+          </p:cNvPr>
+          <p:cNvSpPr txBox="1"/>
+          <p:nvPr/>
+        </p:nvSpPr>
+        <p:spPr>
+          <a:xfrm>
+            <a:off x="1123020" y="5104479"/>
+            <a:ext cx="2351068" cy="400110"/>
+          </a:xfrm>
+          <a:prstGeom prst="rect">
+            <a:avLst/>
+          </a:prstGeom>
+          <a:noFill/>
+        </p:spPr>
+        <p:txBody>
+          <a:bodyPr wrap="square" rtlCol="0">
+            <a:spAutoFit/>
+          </a:bodyPr>
+          <a:lstStyle/>
+          <a:p>
+            <a:r>
+              <a:rPr lang="en-US" sz="2000" dirty="0">
+                <a:latin typeface="Century Gothic" panose="020B0502020202020204" pitchFamily="34" charset="0"/>
+              </a:rPr>
+              <a:t>Sicilian Defense</a:t>
             </a:r>
           </a:p>
         </p:txBody>
@@ -19622,24 +19851,6 @@
 </file>
 
 <file path=customXml/item1.xml><?xml version="1.0" encoding="utf-8"?>
-<?mso-contentType ?>
-<FormTemplates xmlns="http://schemas.microsoft.com/sharepoint/v3/contenttype/forms">
-  <Display>DocumentLibraryForm</Display>
-  <Edit>DocumentLibraryForm</Edit>
-  <New>DocumentLibraryForm</New>
-</FormTemplates>
-</file>
-
-<file path=customXml/item2.xml><?xml version="1.0" encoding="utf-8"?>
-<p:properties xmlns:p="http://schemas.microsoft.com/office/2006/metadata/properties" xmlns:xsi="http://www.w3.org/2001/XMLSchema-instance" xmlns:pc="http://schemas.microsoft.com/office/infopath/2007/PartnerControls">
-  <documentManagement>
-    <Status xmlns="71af3243-3dd4-4a8d-8c0d-dd76da1f02a5">Not started</Status>
-    <MediaServiceKeyPoints xmlns="71af3243-3dd4-4a8d-8c0d-dd76da1f02a5" xsi:nil="true"/>
-  </documentManagement>
-</p:properties>
-</file>
-
-<file path=customXml/item3.xml><?xml version="1.0" encoding="utf-8"?>
 <ct:contentTypeSchema xmlns:ct="http://schemas.microsoft.com/office/2006/metadata/contentType" xmlns:ma="http://schemas.microsoft.com/office/2006/metadata/properties/metaAttributes" ct:_="" ma:_="" ma:contentTypeName="Document" ma:contentTypeID="0x01010079F111ED35F8CC479449609E8A0923A6" ma:contentTypeVersion="12" ma:contentTypeDescription="Create a new document." ma:contentTypeScope="" ma:versionID="a410dd7f93c95333ffa1b60ed6adedd1">
   <xsd:schema xmlns:xsd="http://www.w3.org/2001/XMLSchema" xmlns:xs="http://www.w3.org/2001/XMLSchema" xmlns:p="http://schemas.microsoft.com/office/2006/metadata/properties" xmlns:ns2="71af3243-3dd4-4a8d-8c0d-dd76da1f02a5" xmlns:ns3="16c05727-aa75-4e4a-9b5f-8a80a1165891" targetNamespace="http://schemas.microsoft.com/office/2006/metadata/properties" ma:root="true" ma:fieldsID="a936d9baba76aa3866493feff160faab" ns2:_="" ns3:_="">
     <xsd:import namespace="71af3243-3dd4-4a8d-8c0d-dd76da1f02a5"/>
@@ -19860,25 +20071,25 @@
 </ct:contentTypeSchema>
 </file>
 
-<file path=customXml/itemProps1.xml><?xml version="1.0" encoding="utf-8"?>
-<ds:datastoreItem xmlns:ds="http://schemas.openxmlformats.org/officeDocument/2006/customXml" ds:itemID="{AA3F7EDC-E5B4-4BBC-9D2A-CBE6D46C37AD}">
-  <ds:schemaRefs>
-    <ds:schemaRef ds:uri="http://schemas.microsoft.com/sharepoint/v3/contenttype/forms"/>
-  </ds:schemaRefs>
-</ds:datastoreItem>
+<file path=customXml/item2.xml><?xml version="1.0" encoding="utf-8"?>
+<p:properties xmlns:p="http://schemas.microsoft.com/office/2006/metadata/properties" xmlns:xsi="http://www.w3.org/2001/XMLSchema-instance" xmlns:pc="http://schemas.microsoft.com/office/infopath/2007/PartnerControls">
+  <documentManagement>
+    <Status xmlns="71af3243-3dd4-4a8d-8c0d-dd76da1f02a5">Not started</Status>
+    <MediaServiceKeyPoints xmlns="71af3243-3dd4-4a8d-8c0d-dd76da1f02a5" xsi:nil="true"/>
+  </documentManagement>
+</p:properties>
 </file>
 
-<file path=customXml/itemProps2.xml><?xml version="1.0" encoding="utf-8"?>
-<ds:datastoreItem xmlns:ds="http://schemas.openxmlformats.org/officeDocument/2006/customXml" ds:itemID="{A03EEFF0-FB57-4CB4-8BFC-DF397689E2ED}">
-  <ds:schemaRefs>
-    <ds:schemaRef ds:uri="http://schemas.microsoft.com/office/2006/metadata/properties"/>
-    <ds:schemaRef ds:uri="http://schemas.microsoft.com/office/infopath/2007/PartnerControls"/>
-    <ds:schemaRef ds:uri="71af3243-3dd4-4a8d-8c0d-dd76da1f02a5"/>
-  </ds:schemaRefs>
-</ds:datastoreItem>
+<file path=customXml/item3.xml><?xml version="1.0" encoding="utf-8"?>
+<?mso-contentType ?>
+<FormTemplates xmlns="http://schemas.microsoft.com/sharepoint/v3/contenttype/forms">
+  <Display>DocumentLibraryForm</Display>
+  <Edit>DocumentLibraryForm</Edit>
+  <New>DocumentLibraryForm</New>
+</FormTemplates>
 </file>
 
-<file path=customXml/itemProps3.xml><?xml version="1.0" encoding="utf-8"?>
+<file path=customXml/itemProps1.xml><?xml version="1.0" encoding="utf-8"?>
 <ds:datastoreItem xmlns:ds="http://schemas.openxmlformats.org/officeDocument/2006/customXml" ds:itemID="{93932EF5-314F-409E-8020-FEE5FA0795B9}">
   <ds:schemaRefs>
     <ds:schemaRef ds:uri="http://schemas.microsoft.com/office/2006/metadata/contentType"/>
@@ -19895,4 +20106,22 @@
     <ds:schemaRef ds:uri="http://schemas.microsoft.com/internal/obd"/>
   </ds:schemaRefs>
 </ds:datastoreItem>
+</file>
+
+<file path=customXml/itemProps2.xml><?xml version="1.0" encoding="utf-8"?>
+<ds:datastoreItem xmlns:ds="http://schemas.openxmlformats.org/officeDocument/2006/customXml" ds:itemID="{A03EEFF0-FB57-4CB4-8BFC-DF397689E2ED}">
+  <ds:schemaRefs>
+    <ds:schemaRef ds:uri="http://schemas.microsoft.com/office/2006/metadata/properties"/>
+    <ds:schemaRef ds:uri="http://schemas.microsoft.com/office/infopath/2007/PartnerControls"/>
+    <ds:schemaRef ds:uri="71af3243-3dd4-4a8d-8c0d-dd76da1f02a5"/>
+  </ds:schemaRefs>
+</ds:datastoreItem>
+</file>
+
+<file path=customXml/itemProps3.xml><?xml version="1.0" encoding="utf-8"?>
+<ds:datastoreItem xmlns:ds="http://schemas.openxmlformats.org/officeDocument/2006/customXml" ds:itemID="{AA3F7EDC-E5B4-4BBC-9D2A-CBE6D46C37AD}">
+  <ds:schemaRefs>
+    <ds:schemaRef ds:uri="http://schemas.microsoft.com/sharepoint/v3/contenttype/forms"/>
+  </ds:schemaRefs>
+</ds:datastoreItem>
 </file>
</xml_diff>